<commit_message>
Added link to personal webpage with js app
</commit_message>
<xml_diff>
--- a/Presentation Material/Presentation.pptx
+++ b/Presentation Material/Presentation.pptx
@@ -5,7 +5,7 @@
     <p:sldMasterId id="2147483792" r:id="rId1"/>
   </p:sldMasterIdLst>
   <p:notesMasterIdLst>
-    <p:notesMasterId r:id="rId7"/>
+    <p:notesMasterId r:id="rId8"/>
   </p:notesMasterIdLst>
   <p:sldIdLst>
     <p:sldId id="256" r:id="rId2"/>
@@ -13,6 +13,7 @@
     <p:sldId id="259" r:id="rId4"/>
     <p:sldId id="261" r:id="rId5"/>
     <p:sldId id="260" r:id="rId6"/>
+    <p:sldId id="262" r:id="rId7"/>
   </p:sldIdLst>
   <p:sldSz cx="12192000" cy="6858000"/>
   <p:notesSz cx="6858000" cy="9144000"/>
@@ -652,11 +653,7 @@
           <a:p>
             <a:r>
               <a:rPr lang="en-US" baseline="0" dirty="0" smtClean="0"/>
-              <a:t>h(n) can never overestimate the actual path cost (assumes no obstacles, basically</a:t>
-            </a:r>
-            <a:r>
-              <a:rPr lang="en-US" baseline="0" dirty="0" smtClean="0"/>
-              <a:t>)</a:t>
+              <a:t>h(n) can never overestimate the actual path cost (assumes no obstacles, basically)</a:t>
             </a:r>
           </a:p>
           <a:p>
@@ -4933,8 +4930,8 @@
           </a:extLst>
         </p:spPr>
       </p:pic>
-      <mc:AlternateContent xmlns:mc="http://schemas.openxmlformats.org/markup-compatibility/2006">
-        <mc:Choice xmlns:a14="http://schemas.microsoft.com/office/drawing/2010/main" Requires="a14">
+      <mc:AlternateContent xmlns:mc="http://schemas.openxmlformats.org/markup-compatibility/2006" xmlns:a14="http://schemas.microsoft.com/office/drawing/2010/main">
+        <mc:Choice Requires="a14">
           <p:sp>
             <p:nvSpPr>
               <p:cNvPr id="4" name="TextBox 3"/>
@@ -4957,6 +4954,7 @@
               </a:bodyPr>
               <a:lstStyle/>
               <a:p>
+                <a:pPr/>
                 <a14:m>
                   <m:oMathPara xmlns:m="http://schemas.openxmlformats.org/officeDocument/2006/math">
                     <m:oMathParaPr>
@@ -5053,7 +5051,7 @@
             </p:txBody>
           </p:sp>
         </mc:Choice>
-        <mc:Fallback>
+        <mc:Fallback xmlns="">
           <p:sp>
             <p:nvSpPr>
               <p:cNvPr id="4" name="TextBox 3"/>
@@ -5197,13 +5195,8 @@
             <a:pPr lvl="1"/>
             <a:r>
               <a:rPr lang="en-US" sz="2000" dirty="0" smtClean="0"/>
-              <a:t>Like A*, guaranteed to find the optimal path between two </a:t>
-            </a:r>
-            <a:r>
-              <a:rPr lang="en-US" sz="2000" dirty="0" smtClean="0"/>
-              <a:t>nodes</a:t>
-            </a:r>
-            <a:endParaRPr lang="en-US" sz="2000" dirty="0" smtClean="0"/>
+              <a:t>Like A*, guaranteed to find the optimal path between two nodes</a:t>
+            </a:r>
           </a:p>
           <a:p>
             <a:pPr lvl="1"/>
@@ -5560,6 +5553,65 @@
       </p:par>
     </p:tnLst>
   </p:timing>
+</p:sld>
+</file>
+
+<file path=ppt/slides/slide6.xml><?xml version="1.0" encoding="utf-8"?>
+<p:sld xmlns:a="http://schemas.openxmlformats.org/drawingml/2006/main" xmlns:r="http://schemas.openxmlformats.org/officeDocument/2006/relationships" xmlns:p="http://schemas.openxmlformats.org/presentationml/2006/main">
+  <p:cSld>
+    <p:spTree>
+      <p:nvGrpSpPr>
+        <p:cNvPr id="1" name=""/>
+        <p:cNvGrpSpPr/>
+        <p:nvPr/>
+      </p:nvGrpSpPr>
+      <p:grpSpPr>
+        <a:xfrm>
+          <a:off x="0" y="0"/>
+          <a:ext cx="0" cy="0"/>
+          <a:chOff x="0" y="0"/>
+          <a:chExt cx="0" cy="0"/>
+        </a:xfrm>
+      </p:grpSpPr>
+      <p:sp>
+        <p:nvSpPr>
+          <p:cNvPr id="2" name="Title 1"/>
+          <p:cNvSpPr>
+            <a:spLocks noGrp="1"/>
+          </p:cNvSpPr>
+          <p:nvPr>
+            <p:ph type="ctrTitle"/>
+          </p:nvPr>
+        </p:nvSpPr>
+        <p:spPr>
+          <a:xfrm>
+            <a:off x="1097280" y="436220"/>
+            <a:ext cx="10058400" cy="3566160"/>
+          </a:xfrm>
+        </p:spPr>
+        <p:txBody>
+          <a:bodyPr>
+            <a:normAutofit/>
+          </a:bodyPr>
+          <a:lstStyle/>
+          <a:p>
+            <a:r>
+              <a:rPr lang="en-US" sz="4800" dirty="0"/>
+              <a:t>http://www.rose-hulman.edu/~knispeja/</a:t>
+            </a:r>
+          </a:p>
+        </p:txBody>
+      </p:sp>
+    </p:spTree>
+    <p:extLst>
+      <p:ext uri="{BB962C8B-B14F-4D97-AF65-F5344CB8AC3E}">
+        <p14:creationId xmlns:p14="http://schemas.microsoft.com/office/powerpoint/2010/main" val="2630576327"/>
+      </p:ext>
+    </p:extLst>
+  </p:cSld>
+  <p:clrMapOvr>
+    <a:masterClrMapping/>
+  </p:clrMapOvr>
 </p:sld>
 </file>
 

</xml_diff>